<commit_message>
Post team review update
Signed-off-by: Kip Twitchell <kip.twitchell@us.ibm.com>
</commit_message>
<xml_diff>
--- a/Annual-Reviews/Java GenevaERS October 2025.pptx
+++ b/Annual-Reviews/Java GenevaERS October 2025.pptx
@@ -296,7 +296,7 @@
           <a:p>
             <a:fld id="{25D3A1D4-C2F1-4FBA-9F37-B87A976340E2}" type="datetimeFigureOut">
               <a:rPr lang="en-US" smtClean="0"/>
-              <a:t>12/9/2025</a:t>
+              <a:t>12/11/2025</a:t>
             </a:fld>
             <a:endParaRPr lang="en-US"/>
           </a:p>
@@ -466,7 +466,7 @@
             <a:fld id="{5288BB53-F264-D84E-8876-073A512183CA}" type="datetimeFigureOut">
               <a:rPr lang="en-US" smtClean="0"/>
               <a:pPr/>
-              <a:t>12/9/2025</a:t>
+              <a:t>12/11/2025</a:t>
             </a:fld>
             <a:endParaRPr lang="en-US"/>
           </a:p>
@@ -8430,7 +8430,7 @@
           <a:p>
             <a:r>
               <a:rPr lang="en-US" dirty="0"/>
-              <a:t>Why considering Java?</a:t>
+              <a:t>Why Java?</a:t>
             </a:r>
           </a:p>
         </p:txBody>
@@ -8879,7 +8879,7 @@
           <a:p>
             <a:r>
               <a:rPr lang="en-US" dirty="0"/>
-              <a:t>Also prototyped a new java execution performance engine</a:t>
+              <a:t>Prototyped a new java execution performance engine</a:t>
             </a:r>
           </a:p>
           <a:p>
@@ -8893,7 +8893,7 @@
             </a:r>
             <a:r>
               <a:rPr lang="en-US" dirty="0"/>
-              <a:t> version 5 for this next year</a:t>
+              <a:t> version 5 for the next year</a:t>
             </a:r>
           </a:p>
         </p:txBody>

</xml_diff>